<commit_message>
anonymized hash chain basladik devam ediyoruz figurunu ekledik
</commit_message>
<xml_diff>
--- a/Usage of Hash Chains.pptx
+++ b/Usage of Hash Chains.pptx
@@ -294,7 +294,7 @@
             <a:fld id="{E040858E-0762-46B6-898A-667303D9E070}" type="datetimeFigureOut">
               <a:rPr lang="tr-TR" smtClean="0"/>
               <a:pPr/>
-              <a:t>20.01.2013</a:t>
+              <a:t>1/21/13</a:t>
             </a:fld>
             <a:endParaRPr lang="en-US"/>
           </a:p>
@@ -461,7 +461,7 @@
             <a:fld id="{E040858E-0762-46B6-898A-667303D9E070}" type="datetimeFigureOut">
               <a:rPr lang="tr-TR" smtClean="0"/>
               <a:pPr/>
-              <a:t>20.01.2013</a:t>
+              <a:t>1/21/13</a:t>
             </a:fld>
             <a:endParaRPr lang="en-US"/>
           </a:p>
@@ -638,7 +638,7 @@
             <a:fld id="{E040858E-0762-46B6-898A-667303D9E070}" type="datetimeFigureOut">
               <a:rPr lang="tr-TR" smtClean="0"/>
               <a:pPr/>
-              <a:t>20.01.2013</a:t>
+              <a:t>1/21/13</a:t>
             </a:fld>
             <a:endParaRPr lang="en-US"/>
           </a:p>
@@ -805,7 +805,7 @@
             <a:fld id="{E040858E-0762-46B6-898A-667303D9E070}" type="datetimeFigureOut">
               <a:rPr lang="tr-TR" smtClean="0"/>
               <a:pPr/>
-              <a:t>20.01.2013</a:t>
+              <a:t>1/21/13</a:t>
             </a:fld>
             <a:endParaRPr lang="en-US"/>
           </a:p>
@@ -1048,7 +1048,7 @@
             <a:fld id="{E040858E-0762-46B6-898A-667303D9E070}" type="datetimeFigureOut">
               <a:rPr lang="tr-TR" smtClean="0"/>
               <a:pPr/>
-              <a:t>20.01.2013</a:t>
+              <a:t>1/21/13</a:t>
             </a:fld>
             <a:endParaRPr lang="en-US"/>
           </a:p>
@@ -1333,7 +1333,7 @@
             <a:fld id="{E040858E-0762-46B6-898A-667303D9E070}" type="datetimeFigureOut">
               <a:rPr lang="tr-TR" smtClean="0"/>
               <a:pPr/>
-              <a:t>20.01.2013</a:t>
+              <a:t>1/21/13</a:t>
             </a:fld>
             <a:endParaRPr lang="en-US"/>
           </a:p>
@@ -1752,7 +1752,7 @@
             <a:fld id="{E040858E-0762-46B6-898A-667303D9E070}" type="datetimeFigureOut">
               <a:rPr lang="tr-TR" smtClean="0"/>
               <a:pPr/>
-              <a:t>20.01.2013</a:t>
+              <a:t>1/21/13</a:t>
             </a:fld>
             <a:endParaRPr lang="en-US"/>
           </a:p>
@@ -1867,7 +1867,7 @@
             <a:fld id="{E040858E-0762-46B6-898A-667303D9E070}" type="datetimeFigureOut">
               <a:rPr lang="tr-TR" smtClean="0"/>
               <a:pPr/>
-              <a:t>20.01.2013</a:t>
+              <a:t>1/21/13</a:t>
             </a:fld>
             <a:endParaRPr lang="en-US"/>
           </a:p>
@@ -1959,7 +1959,7 @@
             <a:fld id="{E040858E-0762-46B6-898A-667303D9E070}" type="datetimeFigureOut">
               <a:rPr lang="tr-TR" smtClean="0"/>
               <a:pPr/>
-              <a:t>20.01.2013</a:t>
+              <a:t>1/21/13</a:t>
             </a:fld>
             <a:endParaRPr lang="en-US"/>
           </a:p>
@@ -2233,7 +2233,7 @@
             <a:fld id="{E040858E-0762-46B6-898A-667303D9E070}" type="datetimeFigureOut">
               <a:rPr lang="tr-TR" smtClean="0"/>
               <a:pPr/>
-              <a:t>20.01.2013</a:t>
+              <a:t>1/21/13</a:t>
             </a:fld>
             <a:endParaRPr lang="en-US"/>
           </a:p>
@@ -2483,7 +2483,7 @@
             <a:fld id="{E040858E-0762-46B6-898A-667303D9E070}" type="datetimeFigureOut">
               <a:rPr lang="tr-TR" smtClean="0"/>
               <a:pPr/>
-              <a:t>20.01.2013</a:t>
+              <a:t>1/21/13</a:t>
             </a:fld>
             <a:endParaRPr lang="en-US"/>
           </a:p>
@@ -2693,7 +2693,7 @@
             <a:fld id="{E040858E-0762-46B6-898A-667303D9E070}" type="datetimeFigureOut">
               <a:rPr lang="tr-TR" smtClean="0"/>
               <a:pPr/>
-              <a:t>20.01.2013</a:t>
+              <a:t>1/21/13</a:t>
             </a:fld>
             <a:endParaRPr lang="en-US"/>
           </a:p>
@@ -3104,11 +3104,7 @@
           <a:p>
             <a:r>
               <a:rPr lang="tr-TR" dirty="0" smtClean="0"/>
-              <a:t>Can Serhat </a:t>
-            </a:r>
-            <a:r>
-              <a:rPr lang="tr-TR" dirty="0" smtClean="0"/>
-              <a:t>Leloğlu</a:t>
+              <a:t>Can Serhat Leloğlu</a:t>
             </a:r>
             <a:endParaRPr lang="en-US" dirty="0"/>
           </a:p>
@@ -3195,11 +3191,7 @@
             <a:pPr lvl="1"/>
             <a:r>
               <a:rPr lang="tr-TR" dirty="0" smtClean="0"/>
-              <a:t>For 50 </a:t>
-            </a:r>
-            <a:r>
-              <a:rPr lang="tr-TR" dirty="0" smtClean="0"/>
-              <a:t>minutes of change alias interval</a:t>
+              <a:t>For 50 minutes of change alias interval</a:t>
             </a:r>
           </a:p>
           <a:p>
@@ -3292,7 +3284,7 @@
         </p:nvSpPr>
         <p:spPr>
           <a:xfrm>
-            <a:off x="571472" y="1571612"/>
+            <a:off x="755577" y="1571612"/>
             <a:ext cx="571504" cy="285752"/>
           </a:xfrm>
           <a:prstGeom prst="ellipse">
@@ -3321,10 +3313,14 @@
           <a:p>
             <a:pPr algn="ctr"/>
             <a:r>
-              <a:rPr lang="tr-TR" sz="800" dirty="0" smtClean="0"/>
-              <a:t>H0</a:t>
-            </a:r>
-            <a:endParaRPr lang="en-US" sz="800" dirty="0"/>
+              <a:rPr lang="tr-TR" sz="1000" dirty="0" smtClean="0"/>
+              <a:t>H</a:t>
+            </a:r>
+            <a:r>
+              <a:rPr lang="tr-TR" sz="1000" baseline="-25000" dirty="0" smtClean="0"/>
+              <a:t>0</a:t>
+            </a:r>
+            <a:endParaRPr lang="en-US" sz="1000" dirty="0"/>
           </a:p>
         </p:txBody>
       </p:sp>
@@ -3336,7 +3332,7 @@
         </p:nvSpPr>
         <p:spPr>
           <a:xfrm>
-            <a:off x="571472" y="1928802"/>
+            <a:off x="755577" y="1928802"/>
             <a:ext cx="571504" cy="285752"/>
           </a:xfrm>
           <a:prstGeom prst="ellipse">
@@ -3365,10 +3361,14 @@
           <a:p>
             <a:pPr algn="ctr"/>
             <a:r>
-              <a:rPr lang="tr-TR" sz="800" dirty="0" smtClean="0"/>
-              <a:t>H1</a:t>
-            </a:r>
-            <a:endParaRPr lang="en-US" sz="800" dirty="0"/>
+              <a:rPr lang="tr-TR" sz="1000" dirty="0" smtClean="0"/>
+              <a:t>H</a:t>
+            </a:r>
+            <a:r>
+              <a:rPr lang="tr-TR" sz="1000" baseline="-25000" dirty="0" smtClean="0"/>
+              <a:t>1</a:t>
+            </a:r>
+            <a:endParaRPr lang="en-US" sz="1000" baseline="-25000" dirty="0"/>
           </a:p>
         </p:txBody>
       </p:sp>
@@ -3380,7 +3380,7 @@
         </p:nvSpPr>
         <p:spPr>
           <a:xfrm>
-            <a:off x="571472" y="2285992"/>
+            <a:off x="755577" y="2285992"/>
             <a:ext cx="571504" cy="285752"/>
           </a:xfrm>
           <a:prstGeom prst="ellipse">
@@ -3409,10 +3409,14 @@
           <a:p>
             <a:pPr algn="ctr"/>
             <a:r>
-              <a:rPr lang="tr-TR" sz="800" dirty="0" smtClean="0"/>
-              <a:t>H2</a:t>
-            </a:r>
-            <a:endParaRPr lang="en-US" sz="800" dirty="0"/>
+              <a:rPr lang="tr-TR" sz="1000" dirty="0" smtClean="0"/>
+              <a:t>H</a:t>
+            </a:r>
+            <a:r>
+              <a:rPr lang="tr-TR" sz="1000" baseline="-25000" dirty="0" smtClean="0"/>
+              <a:t>2</a:t>
+            </a:r>
+            <a:endParaRPr lang="en-US" sz="1000" baseline="-25000" dirty="0"/>
           </a:p>
         </p:txBody>
       </p:sp>
@@ -3424,7 +3428,7 @@
         </p:nvSpPr>
         <p:spPr>
           <a:xfrm>
-            <a:off x="571472" y="2643182"/>
+            <a:off x="755577" y="2643182"/>
             <a:ext cx="571504" cy="285752"/>
           </a:xfrm>
           <a:prstGeom prst="ellipse">
@@ -3453,10 +3457,14 @@
           <a:p>
             <a:pPr algn="ctr"/>
             <a:r>
-              <a:rPr lang="tr-TR" sz="800" dirty="0" smtClean="0"/>
-              <a:t>H3</a:t>
-            </a:r>
-            <a:endParaRPr lang="en-US" sz="800" dirty="0"/>
+              <a:rPr lang="tr-TR" sz="1000" dirty="0" smtClean="0"/>
+              <a:t>H</a:t>
+            </a:r>
+            <a:r>
+              <a:rPr lang="tr-TR" sz="1000" baseline="-25000" dirty="0" smtClean="0"/>
+              <a:t>3</a:t>
+            </a:r>
+            <a:endParaRPr lang="en-US" sz="1000" baseline="-25000" dirty="0"/>
           </a:p>
         </p:txBody>
       </p:sp>
@@ -3468,7 +3476,7 @@
         </p:nvSpPr>
         <p:spPr>
           <a:xfrm>
-            <a:off x="571472" y="3000372"/>
+            <a:off x="755577" y="3000372"/>
             <a:ext cx="571504" cy="285752"/>
           </a:xfrm>
           <a:prstGeom prst="ellipse">
@@ -3497,10 +3505,14 @@
           <a:p>
             <a:pPr algn="ctr"/>
             <a:r>
-              <a:rPr lang="tr-TR" sz="800" dirty="0" smtClean="0"/>
-              <a:t>H4</a:t>
-            </a:r>
-            <a:endParaRPr lang="en-US" sz="800" dirty="0"/>
+              <a:rPr lang="tr-TR" sz="1000" dirty="0" smtClean="0"/>
+              <a:t>H</a:t>
+            </a:r>
+            <a:r>
+              <a:rPr lang="tr-TR" sz="1000" baseline="-25000" dirty="0" smtClean="0"/>
+              <a:t>4</a:t>
+            </a:r>
+            <a:endParaRPr lang="en-US" sz="1000" baseline="-25000" dirty="0"/>
           </a:p>
         </p:txBody>
       </p:sp>
@@ -3512,7 +3524,7 @@
         </p:nvSpPr>
         <p:spPr>
           <a:xfrm>
-            <a:off x="571472" y="3357562"/>
+            <a:off x="755577" y="3357562"/>
             <a:ext cx="571504" cy="285752"/>
           </a:xfrm>
           <a:prstGeom prst="ellipse">
@@ -3541,10 +3553,14 @@
           <a:p>
             <a:pPr algn="ctr"/>
             <a:r>
-              <a:rPr lang="tr-TR" sz="800" dirty="0" smtClean="0"/>
-              <a:t>H5</a:t>
-            </a:r>
-            <a:endParaRPr lang="en-US" sz="800" dirty="0"/>
+              <a:rPr lang="tr-TR" sz="1000" dirty="0" smtClean="0"/>
+              <a:t>H</a:t>
+            </a:r>
+            <a:r>
+              <a:rPr lang="tr-TR" sz="1000" baseline="-25000" dirty="0" smtClean="0"/>
+              <a:t>5</a:t>
+            </a:r>
+            <a:endParaRPr lang="en-US" sz="1000" baseline="-25000" dirty="0"/>
           </a:p>
         </p:txBody>
       </p:sp>
@@ -3556,7 +3572,7 @@
         </p:nvSpPr>
         <p:spPr>
           <a:xfrm>
-            <a:off x="571472" y="3714752"/>
+            <a:off x="755577" y="3714752"/>
             <a:ext cx="571504" cy="285752"/>
           </a:xfrm>
           <a:prstGeom prst="ellipse">
@@ -3585,10 +3601,14 @@
           <a:p>
             <a:pPr algn="ctr"/>
             <a:r>
-              <a:rPr lang="tr-TR" sz="800" dirty="0" smtClean="0"/>
-              <a:t>H6</a:t>
-            </a:r>
-            <a:endParaRPr lang="en-US" sz="800" dirty="0"/>
+              <a:rPr lang="tr-TR" sz="1000" dirty="0" smtClean="0"/>
+              <a:t>H</a:t>
+            </a:r>
+            <a:r>
+              <a:rPr lang="tr-TR" sz="1000" baseline="-25000" dirty="0" smtClean="0"/>
+              <a:t>6</a:t>
+            </a:r>
+            <a:endParaRPr lang="en-US" sz="1000" baseline="-25000" dirty="0"/>
           </a:p>
         </p:txBody>
       </p:sp>
@@ -3600,7 +3620,7 @@
         </p:nvSpPr>
         <p:spPr>
           <a:xfrm>
-            <a:off x="571472" y="4071942"/>
+            <a:off x="755577" y="4071942"/>
             <a:ext cx="571504" cy="285752"/>
           </a:xfrm>
           <a:prstGeom prst="ellipse">
@@ -3629,10 +3649,14 @@
           <a:p>
             <a:pPr algn="ctr"/>
             <a:r>
-              <a:rPr lang="tr-TR" sz="800" dirty="0" smtClean="0"/>
-              <a:t>H7</a:t>
-            </a:r>
-            <a:endParaRPr lang="en-US" sz="800" dirty="0"/>
+              <a:rPr lang="tr-TR" sz="1000" dirty="0" smtClean="0"/>
+              <a:t>H</a:t>
+            </a:r>
+            <a:r>
+              <a:rPr lang="tr-TR" sz="1000" baseline="-25000" dirty="0" smtClean="0"/>
+              <a:t>7</a:t>
+            </a:r>
+            <a:endParaRPr lang="en-US" sz="1000" baseline="-25000" dirty="0"/>
           </a:p>
         </p:txBody>
       </p:sp>
@@ -3644,7 +3668,7 @@
         </p:nvSpPr>
         <p:spPr>
           <a:xfrm>
-            <a:off x="571472" y="4429132"/>
+            <a:off x="755577" y="4429132"/>
             <a:ext cx="571504" cy="285752"/>
           </a:xfrm>
           <a:prstGeom prst="ellipse">
@@ -3673,10 +3697,14 @@
           <a:p>
             <a:pPr algn="ctr"/>
             <a:r>
-              <a:rPr lang="tr-TR" sz="800" dirty="0" smtClean="0"/>
-              <a:t>H8</a:t>
-            </a:r>
-            <a:endParaRPr lang="en-US" sz="800" dirty="0"/>
+              <a:rPr lang="tr-TR" sz="1000" dirty="0" smtClean="0"/>
+              <a:t>H</a:t>
+            </a:r>
+            <a:r>
+              <a:rPr lang="tr-TR" sz="1000" baseline="-25000" dirty="0" smtClean="0"/>
+              <a:t>8</a:t>
+            </a:r>
+            <a:endParaRPr lang="en-US" sz="1000" baseline="-25000" dirty="0"/>
           </a:p>
         </p:txBody>
       </p:sp>
@@ -3688,7 +3716,7 @@
         </p:nvSpPr>
         <p:spPr>
           <a:xfrm>
-            <a:off x="571472" y="4786322"/>
+            <a:off x="755577" y="4786322"/>
             <a:ext cx="571504" cy="285752"/>
           </a:xfrm>
           <a:prstGeom prst="ellipse">
@@ -3717,10 +3745,14 @@
           <a:p>
             <a:pPr algn="ctr"/>
             <a:r>
-              <a:rPr lang="tr-TR" sz="800" dirty="0" smtClean="0"/>
-              <a:t>H9</a:t>
-            </a:r>
-            <a:endParaRPr lang="en-US" sz="800" dirty="0"/>
+              <a:rPr lang="tr-TR" sz="1000" dirty="0" smtClean="0"/>
+              <a:t>H</a:t>
+            </a:r>
+            <a:r>
+              <a:rPr lang="tr-TR" sz="1000" baseline="-25000" dirty="0" smtClean="0"/>
+              <a:t>9</a:t>
+            </a:r>
+            <a:endParaRPr lang="en-US" sz="1000" baseline="-25000" dirty="0"/>
           </a:p>
         </p:txBody>
       </p:sp>
@@ -3732,7 +3764,7 @@
         </p:nvSpPr>
         <p:spPr>
           <a:xfrm>
-            <a:off x="571472" y="5143512"/>
+            <a:off x="755577" y="5143512"/>
             <a:ext cx="571504" cy="285752"/>
           </a:xfrm>
           <a:prstGeom prst="ellipse">
@@ -3761,10 +3793,14 @@
           <a:p>
             <a:pPr algn="ctr"/>
             <a:r>
-              <a:rPr lang="tr-TR" sz="800" dirty="0" smtClean="0"/>
-              <a:t>H10</a:t>
-            </a:r>
-            <a:endParaRPr lang="en-US" sz="800" dirty="0"/>
+              <a:rPr lang="tr-TR" sz="1000" dirty="0" smtClean="0"/>
+              <a:t>H</a:t>
+            </a:r>
+            <a:r>
+              <a:rPr lang="tr-TR" sz="1000" baseline="-25000" dirty="0" smtClean="0"/>
+              <a:t>10</a:t>
+            </a:r>
+            <a:endParaRPr lang="en-US" sz="1000" baseline="-25000" dirty="0"/>
           </a:p>
         </p:txBody>
       </p:sp>
@@ -3776,7 +3812,7 @@
         </p:nvSpPr>
         <p:spPr>
           <a:xfrm>
-            <a:off x="571472" y="5500702"/>
+            <a:off x="755577" y="5500702"/>
             <a:ext cx="571504" cy="285752"/>
           </a:xfrm>
           <a:prstGeom prst="ellipse">
@@ -3805,10 +3841,14 @@
           <a:p>
             <a:pPr algn="ctr"/>
             <a:r>
-              <a:rPr lang="tr-TR" sz="800" dirty="0" smtClean="0"/>
-              <a:t>H11</a:t>
-            </a:r>
-            <a:endParaRPr lang="en-US" sz="800" dirty="0"/>
+              <a:rPr lang="tr-TR" sz="1000" dirty="0" smtClean="0"/>
+              <a:t>H</a:t>
+            </a:r>
+            <a:r>
+              <a:rPr lang="tr-TR" sz="1000" baseline="-25000" dirty="0" smtClean="0"/>
+              <a:t>11</a:t>
+            </a:r>
+            <a:endParaRPr lang="en-US" sz="1000" baseline="-25000" dirty="0"/>
           </a:p>
         </p:txBody>
       </p:sp>
@@ -3820,7 +3860,7 @@
         </p:nvSpPr>
         <p:spPr>
           <a:xfrm>
-            <a:off x="571472" y="5857892"/>
+            <a:off x="755577" y="5857892"/>
             <a:ext cx="571504" cy="285752"/>
           </a:xfrm>
           <a:prstGeom prst="ellipse">
@@ -3849,10 +3889,14 @@
           <a:p>
             <a:pPr algn="ctr"/>
             <a:r>
-              <a:rPr lang="tr-TR" sz="800" dirty="0" smtClean="0"/>
-              <a:t>H12</a:t>
-            </a:r>
-            <a:endParaRPr lang="en-US" sz="800" dirty="0"/>
+              <a:rPr lang="tr-TR" sz="1000" dirty="0" smtClean="0"/>
+              <a:t>H</a:t>
+            </a:r>
+            <a:r>
+              <a:rPr lang="tr-TR" sz="1000" baseline="-25000" dirty="0" smtClean="0"/>
+              <a:t>12</a:t>
+            </a:r>
+            <a:endParaRPr lang="en-US" sz="1000" baseline="-25000" dirty="0"/>
           </a:p>
         </p:txBody>
       </p:sp>
@@ -3864,7 +3908,7 @@
         </p:nvSpPr>
         <p:spPr>
           <a:xfrm>
-            <a:off x="571472" y="6215082"/>
+            <a:off x="755577" y="6215082"/>
             <a:ext cx="571504" cy="285752"/>
           </a:xfrm>
           <a:prstGeom prst="ellipse">
@@ -3893,10 +3937,14 @@
           <a:p>
             <a:pPr algn="ctr"/>
             <a:r>
-              <a:rPr lang="tr-TR" sz="800" dirty="0" smtClean="0"/>
-              <a:t>H13</a:t>
-            </a:r>
-            <a:endParaRPr lang="en-US" sz="800" dirty="0"/>
+              <a:rPr lang="tr-TR" sz="1000" dirty="0" smtClean="0"/>
+              <a:t>H</a:t>
+            </a:r>
+            <a:r>
+              <a:rPr lang="tr-TR" sz="1000" baseline="-25000" dirty="0" smtClean="0"/>
+              <a:t>13</a:t>
+            </a:r>
+            <a:endParaRPr lang="en-US" sz="1000" baseline="-25000" dirty="0"/>
           </a:p>
         </p:txBody>
       </p:sp>
@@ -3908,7 +3956,7 @@
         </p:nvSpPr>
         <p:spPr>
           <a:xfrm>
-            <a:off x="285720" y="1071546"/>
+            <a:off x="251520" y="1052736"/>
             <a:ext cx="1160895" cy="523220"/>
           </a:xfrm>
           <a:prstGeom prst="rect">
@@ -3922,6 +3970,7 @@
           </a:bodyPr>
           <a:lstStyle/>
           <a:p>
+            <a:pPr algn="ctr"/>
             <a:r>
               <a:rPr lang="tr-TR" sz="1400" dirty="0" smtClean="0"/>
               <a:t>Original Hash</a:t>
@@ -3974,10 +4023,18 @@
           <a:p>
             <a:pPr algn="ctr"/>
             <a:r>
-              <a:rPr lang="tr-TR" sz="800" dirty="0" smtClean="0"/>
-              <a:t>H0’</a:t>
-            </a:r>
-            <a:endParaRPr lang="en-US" sz="800" dirty="0"/>
+              <a:rPr lang="tr-TR" sz="1000" dirty="0" smtClean="0"/>
+              <a:t>H</a:t>
+            </a:r>
+            <a:r>
+              <a:rPr lang="tr-TR" sz="1000" baseline="-25000" dirty="0" smtClean="0"/>
+              <a:t>0</a:t>
+            </a:r>
+            <a:r>
+              <a:rPr lang="tr-TR" sz="1000" dirty="0" smtClean="0"/>
+              <a:t>’</a:t>
+            </a:r>
+            <a:endParaRPr lang="en-US" sz="1000" dirty="0"/>
           </a:p>
         </p:txBody>
       </p:sp>
@@ -4018,10 +4075,18 @@
           <a:p>
             <a:pPr algn="ctr"/>
             <a:r>
-              <a:rPr lang="tr-TR" sz="800" dirty="0" smtClean="0"/>
-              <a:t>H1’</a:t>
-            </a:r>
-            <a:endParaRPr lang="en-US" sz="800" dirty="0"/>
+              <a:rPr lang="tr-TR" sz="1000" dirty="0" smtClean="0"/>
+              <a:t>H</a:t>
+            </a:r>
+            <a:r>
+              <a:rPr lang="tr-TR" sz="1000" baseline="-25000" dirty="0" smtClean="0"/>
+              <a:t>1</a:t>
+            </a:r>
+            <a:r>
+              <a:rPr lang="tr-TR" sz="1000" dirty="0" smtClean="0"/>
+              <a:t>’</a:t>
+            </a:r>
+            <a:endParaRPr lang="en-US" sz="1000" dirty="0"/>
           </a:p>
         </p:txBody>
       </p:sp>
@@ -4062,10 +4127,18 @@
           <a:p>
             <a:pPr algn="ctr"/>
             <a:r>
-              <a:rPr lang="tr-TR" sz="800" dirty="0" smtClean="0"/>
-              <a:t>H2’</a:t>
-            </a:r>
-            <a:endParaRPr lang="en-US" sz="800" dirty="0"/>
+              <a:rPr lang="tr-TR" sz="1000" dirty="0" smtClean="0"/>
+              <a:t>H</a:t>
+            </a:r>
+            <a:r>
+              <a:rPr lang="tr-TR" sz="1000" baseline="-25000" dirty="0" smtClean="0"/>
+              <a:t>2</a:t>
+            </a:r>
+            <a:r>
+              <a:rPr lang="tr-TR" sz="1000" dirty="0" smtClean="0"/>
+              <a:t>’</a:t>
+            </a:r>
+            <a:endParaRPr lang="en-US" sz="1000" dirty="0"/>
           </a:p>
         </p:txBody>
       </p:sp>
@@ -4106,10 +4179,18 @@
           <a:p>
             <a:pPr algn="ctr"/>
             <a:r>
-              <a:rPr lang="tr-TR" sz="800" dirty="0" smtClean="0"/>
-              <a:t>H3’</a:t>
-            </a:r>
-            <a:endParaRPr lang="en-US" sz="800" dirty="0"/>
+              <a:rPr lang="tr-TR" sz="1000" dirty="0" smtClean="0"/>
+              <a:t>H</a:t>
+            </a:r>
+            <a:r>
+              <a:rPr lang="tr-TR" sz="1000" baseline="-25000" dirty="0" smtClean="0"/>
+              <a:t>3</a:t>
+            </a:r>
+            <a:r>
+              <a:rPr lang="tr-TR" sz="1000" dirty="0" smtClean="0"/>
+              <a:t>’</a:t>
+            </a:r>
+            <a:endParaRPr lang="en-US" sz="1000" dirty="0"/>
           </a:p>
         </p:txBody>
       </p:sp>
@@ -4150,10 +4231,18 @@
           <a:p>
             <a:pPr algn="ctr"/>
             <a:r>
-              <a:rPr lang="tr-TR" sz="800" dirty="0" smtClean="0"/>
-              <a:t>H4’</a:t>
-            </a:r>
-            <a:endParaRPr lang="en-US" sz="800" dirty="0"/>
+              <a:rPr lang="tr-TR" sz="1000" dirty="0" smtClean="0"/>
+              <a:t>H</a:t>
+            </a:r>
+            <a:r>
+              <a:rPr lang="tr-TR" sz="1000" baseline="-25000" dirty="0" smtClean="0"/>
+              <a:t>4</a:t>
+            </a:r>
+            <a:r>
+              <a:rPr lang="tr-TR" sz="1000" dirty="0" smtClean="0"/>
+              <a:t>’</a:t>
+            </a:r>
+            <a:endParaRPr lang="en-US" sz="1000" dirty="0"/>
           </a:p>
         </p:txBody>
       </p:sp>
@@ -4194,10 +4283,18 @@
           <a:p>
             <a:pPr algn="ctr"/>
             <a:r>
-              <a:rPr lang="tr-TR" sz="800" dirty="0" smtClean="0"/>
-              <a:t>H5’</a:t>
-            </a:r>
-            <a:endParaRPr lang="en-US" sz="800" dirty="0"/>
+              <a:rPr lang="tr-TR" sz="1000" dirty="0" smtClean="0"/>
+              <a:t>H</a:t>
+            </a:r>
+            <a:r>
+              <a:rPr lang="tr-TR" sz="1000" baseline="-25000" dirty="0" smtClean="0"/>
+              <a:t>5</a:t>
+            </a:r>
+            <a:r>
+              <a:rPr lang="tr-TR" sz="1000" dirty="0" smtClean="0"/>
+              <a:t>’</a:t>
+            </a:r>
+            <a:endParaRPr lang="en-US" sz="1000" dirty="0"/>
           </a:p>
         </p:txBody>
       </p:sp>
@@ -4238,10 +4335,18 @@
           <a:p>
             <a:pPr algn="ctr"/>
             <a:r>
-              <a:rPr lang="tr-TR" sz="800" dirty="0" smtClean="0"/>
-              <a:t>H6’</a:t>
-            </a:r>
-            <a:endParaRPr lang="en-US" sz="800" dirty="0"/>
+              <a:rPr lang="tr-TR" sz="1000" dirty="0" smtClean="0"/>
+              <a:t>H</a:t>
+            </a:r>
+            <a:r>
+              <a:rPr lang="tr-TR" sz="1000" baseline="-25000" dirty="0" smtClean="0"/>
+              <a:t>6</a:t>
+            </a:r>
+            <a:r>
+              <a:rPr lang="tr-TR" sz="1000" dirty="0" smtClean="0"/>
+              <a:t>’</a:t>
+            </a:r>
+            <a:endParaRPr lang="en-US" sz="1000" dirty="0"/>
           </a:p>
         </p:txBody>
       </p:sp>
@@ -4282,10 +4387,18 @@
           <a:p>
             <a:pPr algn="ctr"/>
             <a:r>
-              <a:rPr lang="tr-TR" sz="800" dirty="0" smtClean="0"/>
-              <a:t>H7’</a:t>
-            </a:r>
-            <a:endParaRPr lang="en-US" sz="800" dirty="0"/>
+              <a:rPr lang="tr-TR" sz="1000" dirty="0" smtClean="0"/>
+              <a:t>H</a:t>
+            </a:r>
+            <a:r>
+              <a:rPr lang="tr-TR" sz="1000" baseline="-25000" dirty="0" smtClean="0"/>
+              <a:t>7</a:t>
+            </a:r>
+            <a:r>
+              <a:rPr lang="tr-TR" sz="1000" dirty="0" smtClean="0"/>
+              <a:t>’</a:t>
+            </a:r>
+            <a:endParaRPr lang="en-US" sz="1000" dirty="0"/>
           </a:p>
         </p:txBody>
       </p:sp>
@@ -4326,10 +4439,18 @@
           <a:p>
             <a:pPr algn="ctr"/>
             <a:r>
-              <a:rPr lang="tr-TR" sz="800" dirty="0" smtClean="0"/>
-              <a:t>H8’</a:t>
-            </a:r>
-            <a:endParaRPr lang="en-US" sz="800" dirty="0"/>
+              <a:rPr lang="tr-TR" sz="1000" dirty="0" smtClean="0"/>
+              <a:t>H</a:t>
+            </a:r>
+            <a:r>
+              <a:rPr lang="tr-TR" sz="1000" baseline="-25000" dirty="0" smtClean="0"/>
+              <a:t>8</a:t>
+            </a:r>
+            <a:r>
+              <a:rPr lang="tr-TR" sz="1000" dirty="0" smtClean="0"/>
+              <a:t>’</a:t>
+            </a:r>
+            <a:endParaRPr lang="en-US" sz="1000" dirty="0"/>
           </a:p>
         </p:txBody>
       </p:sp>
@@ -4370,10 +4491,18 @@
           <a:p>
             <a:pPr algn="ctr"/>
             <a:r>
-              <a:rPr lang="tr-TR" sz="800" dirty="0" smtClean="0"/>
-              <a:t>H9’</a:t>
-            </a:r>
-            <a:endParaRPr lang="en-US" sz="800" dirty="0"/>
+              <a:rPr lang="tr-TR" sz="1000" dirty="0" smtClean="0"/>
+              <a:t>H</a:t>
+            </a:r>
+            <a:r>
+              <a:rPr lang="tr-TR" sz="1000" baseline="-25000" dirty="0" smtClean="0"/>
+              <a:t>9</a:t>
+            </a:r>
+            <a:r>
+              <a:rPr lang="tr-TR" sz="1000" dirty="0" smtClean="0"/>
+              <a:t>’</a:t>
+            </a:r>
+            <a:endParaRPr lang="en-US" sz="1000" dirty="0"/>
           </a:p>
         </p:txBody>
       </p:sp>
@@ -4414,10 +4543,18 @@
           <a:p>
             <a:pPr algn="ctr"/>
             <a:r>
-              <a:rPr lang="tr-TR" sz="800" dirty="0" smtClean="0"/>
-              <a:t>H10’</a:t>
-            </a:r>
-            <a:endParaRPr lang="en-US" sz="800" dirty="0"/>
+              <a:rPr lang="tr-TR" sz="1000" dirty="0" smtClean="0"/>
+              <a:t>H</a:t>
+            </a:r>
+            <a:r>
+              <a:rPr lang="tr-TR" sz="1000" baseline="-25000" dirty="0" smtClean="0"/>
+              <a:t>10</a:t>
+            </a:r>
+            <a:r>
+              <a:rPr lang="tr-TR" sz="1000" dirty="0" smtClean="0"/>
+              <a:t>’</a:t>
+            </a:r>
+            <a:endParaRPr lang="en-US" sz="1000" dirty="0"/>
           </a:p>
         </p:txBody>
       </p:sp>
@@ -4429,8 +4566,8 @@
         </p:nvSpPr>
         <p:spPr>
           <a:xfrm>
-            <a:off x="1428728" y="5131370"/>
-            <a:ext cx="2424062" cy="369332"/>
+            <a:off x="1691680" y="5178678"/>
+            <a:ext cx="2088232" cy="338554"/>
           </a:xfrm>
           <a:prstGeom prst="rect">
             <a:avLst/>
@@ -4438,16 +4575,36 @@
           <a:noFill/>
         </p:spPr>
         <p:txBody>
-          <a:bodyPr wrap="none" rtlCol="0">
+          <a:bodyPr wrap="square" rtlCol="0">
             <a:spAutoFit/>
           </a:bodyPr>
           <a:lstStyle/>
           <a:p>
             <a:r>
-              <a:rPr lang="tr-TR" dirty="0" smtClean="0"/>
-              <a:t>H10’ = h(H10 ⊕ Nonce)</a:t>
-            </a:r>
-            <a:endParaRPr lang="en-US" dirty="0"/>
+              <a:rPr lang="tr-TR" sz="1600" dirty="0" smtClean="0"/>
+              <a:t>H</a:t>
+            </a:r>
+            <a:r>
+              <a:rPr lang="tr-TR" sz="1600" baseline="-25000" dirty="0" smtClean="0"/>
+              <a:t>10</a:t>
+            </a:r>
+            <a:r>
+              <a:rPr lang="tr-TR" sz="1600" dirty="0" smtClean="0"/>
+              <a:t>’ </a:t>
+            </a:r>
+            <a:r>
+              <a:rPr lang="tr-TR" sz="1600" dirty="0" smtClean="0"/>
+              <a:t>= h(H</a:t>
+            </a:r>
+            <a:r>
+              <a:rPr lang="tr-TR" sz="1600" baseline="-25000" dirty="0" smtClean="0"/>
+              <a:t>10</a:t>
+            </a:r>
+            <a:r>
+              <a:rPr lang="tr-TR" sz="1600" dirty="0" smtClean="0"/>
+              <a:t> ⊕ Nonce)</a:t>
+            </a:r>
+            <a:endParaRPr lang="en-US" sz="1600" dirty="0"/>
           </a:p>
         </p:txBody>
       </p:sp>
@@ -4455,14 +4612,15 @@
         <p:nvCxnSpPr>
           <p:cNvPr id="32" name="Straight Arrow Connector 31"/>
           <p:cNvCxnSpPr>
+            <a:stCxn id="14" idx="6"/>
             <a:endCxn id="30" idx="1"/>
           </p:cNvCxnSpPr>
           <p:nvPr/>
         </p:nvCxnSpPr>
         <p:spPr>
           <a:xfrm>
-            <a:off x="1214414" y="5286388"/>
-            <a:ext cx="214314" cy="29648"/>
+            <a:off x="1327081" y="5286388"/>
+            <a:ext cx="364599" cy="61567"/>
           </a:xfrm>
           <a:prstGeom prst="straightConnector1">
             <a:avLst/>
@@ -4497,8 +4655,8 @@
         </p:nvCxnSpPr>
         <p:spPr>
           <a:xfrm flipV="1">
-            <a:off x="3852790" y="5286388"/>
-            <a:ext cx="219144" cy="29648"/>
+            <a:off x="3779912" y="5286388"/>
+            <a:ext cx="292022" cy="61567"/>
           </a:xfrm>
           <a:prstGeom prst="straightConnector1">
             <a:avLst/>
@@ -4930,13 +5088,8 @@
             </a:pPr>
             <a:r>
               <a:rPr lang="tr-TR" dirty="0" smtClean="0"/>
-              <a:t>Client sends H0 to TTP, client and TTP calculate the alternative hash </a:t>
-            </a:r>
-            <a:r>
-              <a:rPr lang="tr-TR" dirty="0" smtClean="0"/>
-              <a:t>chain in Initial Authorization or Reuse-CC protocols</a:t>
-            </a:r>
-            <a:endParaRPr lang="tr-TR" dirty="0" smtClean="0"/>
+              <a:t>Client sends H0 to TTP, client and TTP calculate the alternative hash chain in Initial Authorization or Reuse-CC protocols</a:t>
+            </a:r>
           </a:p>
           <a:p>
             <a:pPr>
@@ -4952,15 +5105,7 @@
             </a:pPr>
             <a:r>
               <a:rPr lang="tr-TR" dirty="0" smtClean="0"/>
-              <a:t>TTP calculates the Alias and last token of the alternative hash </a:t>
-            </a:r>
-            <a:r>
-              <a:rPr lang="tr-TR" dirty="0" smtClean="0"/>
-              <a:t>chain (e.g. H10’) by using </a:t>
-            </a:r>
-            <a:r>
-              <a:rPr lang="tr-TR" dirty="0" smtClean="0"/>
-              <a:t>the same nonce value</a:t>
+              <a:t>TTP calculates the Alias and last token of the alternative hash chain (e.g. H10’) by using the same nonce value</a:t>
             </a:r>
           </a:p>
           <a:p>
@@ -4994,27 +5139,7 @@
             </a:pPr>
             <a:r>
               <a:rPr lang="tr-TR" dirty="0" smtClean="0"/>
-              <a:t>If the client disconnects before spending all of the alternative hash </a:t>
-            </a:r>
-            <a:r>
-              <a:rPr lang="tr-TR" dirty="0" smtClean="0"/>
-              <a:t>tokens (e.g. At H3), </a:t>
-            </a:r>
-            <a:r>
-              <a:rPr lang="tr-TR" dirty="0" smtClean="0"/>
-              <a:t>the next time he </a:t>
-            </a:r>
-            <a:r>
-              <a:rPr lang="tr-TR" dirty="0" smtClean="0"/>
-              <a:t>connects; </a:t>
-            </a:r>
-            <a:r>
-              <a:rPr lang="tr-TR" dirty="0" smtClean="0"/>
-              <a:t>he will generate a new alternative hash chain starting from the last </a:t>
-            </a:r>
-            <a:r>
-              <a:rPr lang="tr-TR" dirty="0" smtClean="0"/>
-              <a:t>point (e.g. H3 to H13).</a:t>
+              <a:t>If the client disconnects before spending all of the alternative hash tokens (e.g. At H3), the next time he connects; he will generate a new alternative hash chain starting from the last point (e.g. H3 to H13).</a:t>
             </a:r>
             <a:endParaRPr lang="en-US" dirty="0"/>
           </a:p>
@@ -5028,7 +5153,7 @@
         </p:nvCxnSpPr>
         <p:spPr>
           <a:xfrm rot="10800000">
-            <a:off x="571472" y="4929198"/>
+            <a:off x="755577" y="4929198"/>
             <a:ext cx="1588" cy="357190"/>
           </a:xfrm>
           <a:prstGeom prst="curvedConnector3">
@@ -5063,7 +5188,7 @@
         </p:nvCxnSpPr>
         <p:spPr>
           <a:xfrm rot="10800000">
-            <a:off x="571472" y="4572008"/>
+            <a:off x="755577" y="4572008"/>
             <a:ext cx="1588" cy="357190"/>
           </a:xfrm>
           <a:prstGeom prst="curvedConnector3">
@@ -5098,7 +5223,7 @@
         </p:nvCxnSpPr>
         <p:spPr>
           <a:xfrm rot="10800000">
-            <a:off x="571472" y="4214818"/>
+            <a:off x="755577" y="4214818"/>
             <a:ext cx="1588" cy="357190"/>
           </a:xfrm>
           <a:prstGeom prst="curvedConnector3">
@@ -5133,7 +5258,7 @@
         </p:nvCxnSpPr>
         <p:spPr>
           <a:xfrm rot="10800000">
-            <a:off x="571472" y="3857628"/>
+            <a:off x="755577" y="3857628"/>
             <a:ext cx="1588" cy="357190"/>
           </a:xfrm>
           <a:prstGeom prst="curvedConnector3">
@@ -5168,7 +5293,7 @@
         </p:nvCxnSpPr>
         <p:spPr>
           <a:xfrm rot="10800000">
-            <a:off x="571472" y="3500438"/>
+            <a:off x="755577" y="3500438"/>
             <a:ext cx="1588" cy="357190"/>
           </a:xfrm>
           <a:prstGeom prst="curvedConnector3">
@@ -5203,7 +5328,7 @@
         </p:nvCxnSpPr>
         <p:spPr>
           <a:xfrm rot="10800000">
-            <a:off x="571472" y="3143248"/>
+            <a:off x="755577" y="3143248"/>
             <a:ext cx="1588" cy="357190"/>
           </a:xfrm>
           <a:prstGeom prst="curvedConnector3">
@@ -5238,7 +5363,7 @@
         </p:nvCxnSpPr>
         <p:spPr>
           <a:xfrm rot="10800000">
-            <a:off x="571472" y="2786058"/>
+            <a:off x="755577" y="2786058"/>
             <a:ext cx="1588" cy="357190"/>
           </a:xfrm>
           <a:prstGeom prst="curvedConnector3">
@@ -5273,7 +5398,7 @@
         </p:nvCxnSpPr>
         <p:spPr>
           <a:xfrm rot="10800000">
-            <a:off x="571472" y="2428868"/>
+            <a:off x="755577" y="2428868"/>
             <a:ext cx="1588" cy="357190"/>
           </a:xfrm>
           <a:prstGeom prst="curvedConnector3">
@@ -5308,7 +5433,7 @@
         </p:nvCxnSpPr>
         <p:spPr>
           <a:xfrm rot="10800000">
-            <a:off x="571472" y="2071678"/>
+            <a:off x="755577" y="2071678"/>
             <a:ext cx="1588" cy="357190"/>
           </a:xfrm>
           <a:prstGeom prst="curvedConnector3">
@@ -5343,7 +5468,7 @@
         </p:nvCxnSpPr>
         <p:spPr>
           <a:xfrm rot="10800000">
-            <a:off x="571472" y="1714488"/>
+            <a:off x="755577" y="1714488"/>
             <a:ext cx="1588" cy="357190"/>
           </a:xfrm>
           <a:prstGeom prst="curvedConnector3">
@@ -5378,7 +5503,7 @@
         </p:nvCxnSpPr>
         <p:spPr>
           <a:xfrm rot="10800000">
-            <a:off x="571472" y="5286388"/>
+            <a:off x="755577" y="5286388"/>
             <a:ext cx="1588" cy="357190"/>
           </a:xfrm>
           <a:prstGeom prst="curvedConnector3">
@@ -5413,7 +5538,7 @@
         </p:nvCxnSpPr>
         <p:spPr>
           <a:xfrm rot="10800000">
-            <a:off x="571472" y="5643578"/>
+            <a:off x="755577" y="5643578"/>
             <a:ext cx="1588" cy="357190"/>
           </a:xfrm>
           <a:prstGeom prst="curvedConnector3">
@@ -5448,7 +5573,7 @@
         </p:nvCxnSpPr>
         <p:spPr>
           <a:xfrm rot="10800000">
-            <a:off x="571472" y="6000768"/>
+            <a:off x="755577" y="6000768"/>
             <a:ext cx="1588" cy="357190"/>
           </a:xfrm>
           <a:prstGeom prst="curvedConnector3">
@@ -5483,8 +5608,8 @@
         </p:nvSpPr>
         <p:spPr>
           <a:xfrm>
-            <a:off x="3643306" y="1071546"/>
-            <a:ext cx="1397627" cy="523220"/>
+            <a:off x="3520941" y="1052736"/>
+            <a:ext cx="1748946" cy="523220"/>
           </a:xfrm>
           <a:prstGeom prst="rect">
             <a:avLst/>
@@ -5497,10 +5622,20 @@
           </a:bodyPr>
           <a:lstStyle/>
           <a:p>
+            <a:pPr algn="ctr"/>
             <a:r>
               <a:rPr lang="tr-TR" sz="1400" dirty="0" smtClean="0"/>
-              <a:t>Alternative Hash</a:t>
-            </a:r>
+              <a:t>Anonymized Sub</a:t>
+            </a:r>
+            <a:r>
+              <a:rPr lang="tr-TR" sz="1400" dirty="0"/>
+              <a:t>h</a:t>
+            </a:r>
+            <a:r>
+              <a:rPr lang="tr-TR" sz="1400" dirty="0" smtClean="0"/>
+              <a:t>ash</a:t>
+            </a:r>
+            <a:endParaRPr lang="tr-TR" sz="1400" dirty="0" smtClean="0"/>
           </a:p>
           <a:p>
             <a:pPr algn="ctr"/>
@@ -5583,27 +5718,14 @@
           <a:p>
             <a:r>
               <a:rPr lang="tr-TR" dirty="0" smtClean="0"/>
-              <a:t>Access points prolong the service intervals of existing aliases by 1 </a:t>
-            </a:r>
+              <a:t>Access points prolong the service intervals of existing aliases by 1 minute to make the change alias process seamless to the clients.</a:t>
+            </a:r>
+          </a:p>
+          <a:p>
             <a:r>
               <a:rPr lang="tr-TR" dirty="0" smtClean="0"/>
-              <a:t>minute </a:t>
-            </a:r>
-            <a:r>
-              <a:rPr lang="tr-TR" dirty="0" smtClean="0"/>
-              <a:t>to make the change alias process seamless to the clients.</a:t>
-            </a:r>
-          </a:p>
-          <a:p>
-            <a:r>
-              <a:rPr lang="tr-TR" dirty="0" smtClean="0"/>
-              <a:t>Clients use the new alternative hash chain to get </a:t>
-            </a:r>
-            <a:r>
-              <a:rPr lang="tr-TR" dirty="0" smtClean="0"/>
-              <a:t>service once their 1 additional minute is over</a:t>
-            </a:r>
-            <a:endParaRPr lang="tr-TR" dirty="0" smtClean="0"/>
+              <a:t>Clients use the new alternative hash chain to get service once their 1 additional minute is over</a:t>
+            </a:r>
           </a:p>
           <a:p>
             <a:endParaRPr lang="en-US" dirty="0"/>
@@ -5760,26 +5882,13 @@
           <a:p>
             <a:r>
               <a:rPr lang="tr-TR" dirty="0" smtClean="0"/>
-              <a:t>This scheme adds </a:t>
-            </a:r>
+              <a:t>This scheme adds some tiny delay to the system (Less than 0.08 second)</a:t>
+            </a:r>
+          </a:p>
+          <a:p>
             <a:r>
               <a:rPr lang="tr-TR" dirty="0" smtClean="0"/>
-              <a:t>some tiny delay to the </a:t>
-            </a:r>
-            <a:r>
-              <a:rPr lang="tr-TR" dirty="0" smtClean="0"/>
-              <a:t>system (Less than 0.08 second)</a:t>
-            </a:r>
-            <a:endParaRPr lang="tr-TR" dirty="0" smtClean="0"/>
-          </a:p>
-          <a:p>
-            <a:r>
-              <a:rPr lang="tr-TR" dirty="0" smtClean="0"/>
-              <a:t>The transmitted packet lengths are the same with the previous </a:t>
-            </a:r>
-            <a:r>
-              <a:rPr lang="tr-TR" dirty="0" smtClean="0"/>
-              <a:t>proposition</a:t>
+              <a:t>The transmitted packet lengths are the same with the previous proposition</a:t>
             </a:r>
           </a:p>
           <a:p>
@@ -5801,7 +5910,6 @@
               <a:rPr lang="tr-TR" dirty="0" smtClean="0"/>
               <a:t>The actions of the clients are indeed untraceable between sessions</a:t>
             </a:r>
-            <a:endParaRPr lang="tr-TR" dirty="0" smtClean="0"/>
           </a:p>
         </p:txBody>
       </p:sp>

</xml_diff>